<commit_message>
Added jump up and jump down buttons
</commit_message>
<xml_diff>
--- a/OliveOyl.pptx
+++ b/OliveOyl.pptx
@@ -9,6 +9,7 @@
     <p:sldId id="257" r:id="rId3"/>
     <p:sldId id="258" r:id="rId4"/>
     <p:sldId id="259" r:id="rId5"/>
+    <p:sldId id="260" r:id="rId6"/>
   </p:sldIdLst>
   <p:sldSz cx="12192000" cy="6858000"/>
   <p:notesSz cx="6858000" cy="9144000"/>
@@ -257,7 +258,7 @@
           <a:p>
             <a:fld id="{0F8B8E06-774B-4C1B-8C61-96D063F89AD3}" type="datetimeFigureOut">
               <a:rPr lang="en-IN" smtClean="0"/>
-              <a:t>27-05-2015</a:t>
+              <a:t>28-05-2015</a:t>
             </a:fld>
             <a:endParaRPr lang="en-IN"/>
           </a:p>
@@ -427,7 +428,7 @@
           <a:p>
             <a:fld id="{0F8B8E06-774B-4C1B-8C61-96D063F89AD3}" type="datetimeFigureOut">
               <a:rPr lang="en-IN" smtClean="0"/>
-              <a:t>27-05-2015</a:t>
+              <a:t>28-05-2015</a:t>
             </a:fld>
             <a:endParaRPr lang="en-IN"/>
           </a:p>
@@ -607,7 +608,7 @@
           <a:p>
             <a:fld id="{0F8B8E06-774B-4C1B-8C61-96D063F89AD3}" type="datetimeFigureOut">
               <a:rPr lang="en-IN" smtClean="0"/>
-              <a:t>27-05-2015</a:t>
+              <a:t>28-05-2015</a:t>
             </a:fld>
             <a:endParaRPr lang="en-IN"/>
           </a:p>
@@ -777,7 +778,7 @@
           <a:p>
             <a:fld id="{0F8B8E06-774B-4C1B-8C61-96D063F89AD3}" type="datetimeFigureOut">
               <a:rPr lang="en-IN" smtClean="0"/>
-              <a:t>27-05-2015</a:t>
+              <a:t>28-05-2015</a:t>
             </a:fld>
             <a:endParaRPr lang="en-IN"/>
           </a:p>
@@ -1023,7 +1024,7 @@
           <a:p>
             <a:fld id="{0F8B8E06-774B-4C1B-8C61-96D063F89AD3}" type="datetimeFigureOut">
               <a:rPr lang="en-IN" smtClean="0"/>
-              <a:t>27-05-2015</a:t>
+              <a:t>28-05-2015</a:t>
             </a:fld>
             <a:endParaRPr lang="en-IN"/>
           </a:p>
@@ -1255,7 +1256,7 @@
           <a:p>
             <a:fld id="{0F8B8E06-774B-4C1B-8C61-96D063F89AD3}" type="datetimeFigureOut">
               <a:rPr lang="en-IN" smtClean="0"/>
-              <a:t>27-05-2015</a:t>
+              <a:t>28-05-2015</a:t>
             </a:fld>
             <a:endParaRPr lang="en-IN"/>
           </a:p>
@@ -1622,7 +1623,7 @@
           <a:p>
             <a:fld id="{0F8B8E06-774B-4C1B-8C61-96D063F89AD3}" type="datetimeFigureOut">
               <a:rPr lang="en-IN" smtClean="0"/>
-              <a:t>27-05-2015</a:t>
+              <a:t>28-05-2015</a:t>
             </a:fld>
             <a:endParaRPr lang="en-IN"/>
           </a:p>
@@ -1740,7 +1741,7 @@
           <a:p>
             <a:fld id="{0F8B8E06-774B-4C1B-8C61-96D063F89AD3}" type="datetimeFigureOut">
               <a:rPr lang="en-IN" smtClean="0"/>
-              <a:t>27-05-2015</a:t>
+              <a:t>28-05-2015</a:t>
             </a:fld>
             <a:endParaRPr lang="en-IN"/>
           </a:p>
@@ -1835,7 +1836,7 @@
           <a:p>
             <a:fld id="{0F8B8E06-774B-4C1B-8C61-96D063F89AD3}" type="datetimeFigureOut">
               <a:rPr lang="en-IN" smtClean="0"/>
-              <a:t>27-05-2015</a:t>
+              <a:t>28-05-2015</a:t>
             </a:fld>
             <a:endParaRPr lang="en-IN"/>
           </a:p>
@@ -2112,7 +2113,7 @@
           <a:p>
             <a:fld id="{0F8B8E06-774B-4C1B-8C61-96D063F89AD3}" type="datetimeFigureOut">
               <a:rPr lang="en-IN" smtClean="0"/>
-              <a:t>27-05-2015</a:t>
+              <a:t>28-05-2015</a:t>
             </a:fld>
             <a:endParaRPr lang="en-IN"/>
           </a:p>
@@ -2365,7 +2366,7 @@
           <a:p>
             <a:fld id="{0F8B8E06-774B-4C1B-8C61-96D063F89AD3}" type="datetimeFigureOut">
               <a:rPr lang="en-IN" smtClean="0"/>
-              <a:t>27-05-2015</a:t>
+              <a:t>28-05-2015</a:t>
             </a:fld>
             <a:endParaRPr lang="en-IN"/>
           </a:p>
@@ -2578,7 +2579,7 @@
           <a:p>
             <a:fld id="{0F8B8E06-774B-4C1B-8C61-96D063F89AD3}" type="datetimeFigureOut">
               <a:rPr lang="en-IN" smtClean="0"/>
-              <a:t>27-05-2015</a:t>
+              <a:t>28-05-2015</a:t>
             </a:fld>
             <a:endParaRPr lang="en-IN"/>
           </a:p>
@@ -7788,6 +7789,1498 @@
 </p:sld>
 </file>
 
+<file path=ppt/slides/slide5.xml><?xml version="1.0" encoding="utf-8"?>
+<p:sld xmlns:a="http://schemas.openxmlformats.org/drawingml/2006/main" xmlns:r="http://schemas.openxmlformats.org/officeDocument/2006/relationships" xmlns:p="http://schemas.openxmlformats.org/presentationml/2006/main">
+  <p:cSld>
+    <p:spTree>
+      <p:nvGrpSpPr>
+        <p:cNvPr id="1" name=""/>
+        <p:cNvGrpSpPr/>
+        <p:nvPr/>
+      </p:nvGrpSpPr>
+      <p:grpSpPr>
+        <a:xfrm>
+          <a:off x="0" y="0"/>
+          <a:ext cx="0" cy="0"/>
+          <a:chOff x="0" y="0"/>
+          <a:chExt cx="0" cy="0"/>
+        </a:xfrm>
+      </p:grpSpPr>
+      <p:grpSp>
+        <p:nvGrpSpPr>
+          <p:cNvPr id="62" name="Group 61"/>
+          <p:cNvGrpSpPr/>
+          <p:nvPr/>
+        </p:nvGrpSpPr>
+        <p:grpSpPr>
+          <a:xfrm>
+            <a:off x="1644250" y="3657600"/>
+            <a:ext cx="1057827" cy="1313638"/>
+            <a:chOff x="1644250" y="1060077"/>
+            <a:chExt cx="3149521" cy="3911161"/>
+          </a:xfrm>
+        </p:grpSpPr>
+        <p:sp>
+          <p:nvSpPr>
+            <p:cNvPr id="60" name="Isosceles Triangle 39"/>
+            <p:cNvSpPr/>
+            <p:nvPr/>
+          </p:nvSpPr>
+          <p:spPr>
+            <a:xfrm>
+              <a:off x="2349096" y="1104452"/>
+              <a:ext cx="1924418" cy="1683601"/>
+            </a:xfrm>
+            <a:custGeom>
+              <a:avLst/>
+              <a:gdLst>
+                <a:gd name="connsiteX0" fmla="*/ 0 w 2573769"/>
+                <a:gd name="connsiteY0" fmla="*/ 2218766 h 2218766"/>
+                <a:gd name="connsiteX1" fmla="*/ 1286885 w 2573769"/>
+                <a:gd name="connsiteY1" fmla="*/ 0 h 2218766"/>
+                <a:gd name="connsiteX2" fmla="*/ 2573769 w 2573769"/>
+                <a:gd name="connsiteY2" fmla="*/ 2218766 h 2218766"/>
+                <a:gd name="connsiteX3" fmla="*/ 0 w 2573769"/>
+                <a:gd name="connsiteY3" fmla="*/ 2218766 h 2218766"/>
+                <a:gd name="connsiteX0" fmla="*/ 0 w 2573769"/>
+                <a:gd name="connsiteY0" fmla="*/ 2191872 h 2191872"/>
+                <a:gd name="connsiteX1" fmla="*/ 1286885 w 2573769"/>
+                <a:gd name="connsiteY1" fmla="*/ 0 h 2191872"/>
+                <a:gd name="connsiteX2" fmla="*/ 2573769 w 2573769"/>
+                <a:gd name="connsiteY2" fmla="*/ 2191872 h 2191872"/>
+                <a:gd name="connsiteX3" fmla="*/ 0 w 2573769"/>
+                <a:gd name="connsiteY3" fmla="*/ 2191872 h 2191872"/>
+                <a:gd name="connsiteX0" fmla="*/ 0 w 2573769"/>
+                <a:gd name="connsiteY0" fmla="*/ 2191872 h 2191872"/>
+                <a:gd name="connsiteX1" fmla="*/ 1286885 w 2573769"/>
+                <a:gd name="connsiteY1" fmla="*/ 0 h 2191872"/>
+                <a:gd name="connsiteX2" fmla="*/ 2573769 w 2573769"/>
+                <a:gd name="connsiteY2" fmla="*/ 2191872 h 2191872"/>
+                <a:gd name="connsiteX3" fmla="*/ 0 w 2573769"/>
+                <a:gd name="connsiteY3" fmla="*/ 2191872 h 2191872"/>
+                <a:gd name="connsiteX0" fmla="*/ 0 w 2573769"/>
+                <a:gd name="connsiteY0" fmla="*/ 2191882 h 2191882"/>
+                <a:gd name="connsiteX1" fmla="*/ 1286885 w 2573769"/>
+                <a:gd name="connsiteY1" fmla="*/ 10 h 2191882"/>
+                <a:gd name="connsiteX2" fmla="*/ 2573769 w 2573769"/>
+                <a:gd name="connsiteY2" fmla="*/ 2191882 h 2191882"/>
+                <a:gd name="connsiteX3" fmla="*/ 0 w 2573769"/>
+                <a:gd name="connsiteY3" fmla="*/ 2191882 h 2191882"/>
+                <a:gd name="connsiteX0" fmla="*/ 48203 w 2621972"/>
+                <a:gd name="connsiteY0" fmla="*/ 2191882 h 2462815"/>
+                <a:gd name="connsiteX1" fmla="*/ 1335088 w 2621972"/>
+                <a:gd name="connsiteY1" fmla="*/ 10 h 2462815"/>
+                <a:gd name="connsiteX2" fmla="*/ 2621972 w 2621972"/>
+                <a:gd name="connsiteY2" fmla="*/ 2191882 h 2462815"/>
+                <a:gd name="connsiteX3" fmla="*/ 48203 w 2621972"/>
+                <a:gd name="connsiteY3" fmla="*/ 2191882 h 2462815"/>
+                <a:gd name="connsiteX0" fmla="*/ 48203 w 2651690"/>
+                <a:gd name="connsiteY0" fmla="*/ 2191882 h 2604941"/>
+                <a:gd name="connsiteX1" fmla="*/ 1335088 w 2651690"/>
+                <a:gd name="connsiteY1" fmla="*/ 10 h 2604941"/>
+                <a:gd name="connsiteX2" fmla="*/ 2621972 w 2651690"/>
+                <a:gd name="connsiteY2" fmla="*/ 2191882 h 2604941"/>
+                <a:gd name="connsiteX3" fmla="*/ 48203 w 2651690"/>
+                <a:gd name="connsiteY3" fmla="*/ 2191882 h 2604941"/>
+                <a:gd name="connsiteX0" fmla="*/ 93510 w 2733500"/>
+                <a:gd name="connsiteY0" fmla="*/ 2192039 h 2605098"/>
+                <a:gd name="connsiteX1" fmla="*/ 1380395 w 2733500"/>
+                <a:gd name="connsiteY1" fmla="*/ 167 h 2605098"/>
+                <a:gd name="connsiteX2" fmla="*/ 2667279 w 2733500"/>
+                <a:gd name="connsiteY2" fmla="*/ 2192039 h 2605098"/>
+                <a:gd name="connsiteX3" fmla="*/ 93510 w 2733500"/>
+                <a:gd name="connsiteY3" fmla="*/ 2192039 h 2605098"/>
+                <a:gd name="connsiteX0" fmla="*/ 64373 w 2679874"/>
+                <a:gd name="connsiteY0" fmla="*/ 2192131 h 2605190"/>
+                <a:gd name="connsiteX1" fmla="*/ 1351258 w 2679874"/>
+                <a:gd name="connsiteY1" fmla="*/ 259 h 2605190"/>
+                <a:gd name="connsiteX2" fmla="*/ 2638142 w 2679874"/>
+                <a:gd name="connsiteY2" fmla="*/ 2192131 h 2605190"/>
+                <a:gd name="connsiteX3" fmla="*/ 64373 w 2679874"/>
+                <a:gd name="connsiteY3" fmla="*/ 2192131 h 2605190"/>
+                <a:gd name="connsiteX0" fmla="*/ 79924 w 2695425"/>
+                <a:gd name="connsiteY0" fmla="*/ 2192131 h 2645884"/>
+                <a:gd name="connsiteX1" fmla="*/ 1366809 w 2695425"/>
+                <a:gd name="connsiteY1" fmla="*/ 259 h 2645884"/>
+                <a:gd name="connsiteX2" fmla="*/ 2653693 w 2695425"/>
+                <a:gd name="connsiteY2" fmla="*/ 2192131 h 2645884"/>
+                <a:gd name="connsiteX3" fmla="*/ 79924 w 2695425"/>
+                <a:gd name="connsiteY3" fmla="*/ 2192131 h 2645884"/>
+                <a:gd name="connsiteX0" fmla="*/ 79924 w 2730309"/>
+                <a:gd name="connsiteY0" fmla="*/ 2192142 h 2670965"/>
+                <a:gd name="connsiteX1" fmla="*/ 1366809 w 2730309"/>
+                <a:gd name="connsiteY1" fmla="*/ 270 h 2670965"/>
+                <a:gd name="connsiteX2" fmla="*/ 2653693 w 2730309"/>
+                <a:gd name="connsiteY2" fmla="*/ 2192142 h 2670965"/>
+                <a:gd name="connsiteX3" fmla="*/ 79924 w 2730309"/>
+                <a:gd name="connsiteY3" fmla="*/ 2192142 h 2670965"/>
+              </a:gdLst>
+              <a:ahLst/>
+              <a:cxnLst>
+                <a:cxn ang="0">
+                  <a:pos x="connsiteX0" y="connsiteY0"/>
+                </a:cxn>
+                <a:cxn ang="0">
+                  <a:pos x="connsiteX1" y="connsiteY1"/>
+                </a:cxn>
+                <a:cxn ang="0">
+                  <a:pos x="connsiteX2" y="connsiteY2"/>
+                </a:cxn>
+                <a:cxn ang="0">
+                  <a:pos x="connsiteX3" y="connsiteY3"/>
+                </a:cxn>
+              </a:cxnLst>
+              <a:rect l="l" t="t" r="r" b="b"/>
+              <a:pathLst>
+                <a:path w="2730309" h="2670965">
+                  <a:moveTo>
+                    <a:pt x="79924" y="2192142"/>
+                  </a:moveTo>
+                  <a:cubicBezTo>
+                    <a:pt x="-220486" y="1480872"/>
+                    <a:pt x="351528" y="24837"/>
+                    <a:pt x="1366809" y="270"/>
+                  </a:cubicBezTo>
+                  <a:cubicBezTo>
+                    <a:pt x="2382090" y="-24297"/>
+                    <a:pt x="2944966" y="1630944"/>
+                    <a:pt x="2653693" y="2192142"/>
+                  </a:cubicBezTo>
+                  <a:cubicBezTo>
+                    <a:pt x="2362420" y="2753340"/>
+                    <a:pt x="380334" y="2903412"/>
+                    <a:pt x="79924" y="2192142"/>
+                  </a:cubicBezTo>
+                  <a:close/>
+                </a:path>
+              </a:pathLst>
+            </a:custGeom>
+            <a:solidFill>
+              <a:schemeClr val="accent2">
+                <a:lumMod val="75000"/>
+              </a:schemeClr>
+            </a:solidFill>
+            <a:ln>
+              <a:noFill/>
+            </a:ln>
+          </p:spPr>
+          <p:style>
+            <a:lnRef idx="2">
+              <a:schemeClr val="accent1">
+                <a:shade val="50000"/>
+              </a:schemeClr>
+            </a:lnRef>
+            <a:fillRef idx="1">
+              <a:schemeClr val="accent1"/>
+            </a:fillRef>
+            <a:effectRef idx="0">
+              <a:schemeClr val="accent1"/>
+            </a:effectRef>
+            <a:fontRef idx="minor">
+              <a:schemeClr val="lt1"/>
+            </a:fontRef>
+          </p:style>
+          <p:txBody>
+            <a:bodyPr rtlCol="0" anchor="ctr"/>
+            <a:lstStyle/>
+            <a:p>
+              <a:pPr algn="ctr"/>
+              <a:endParaRPr lang="en-IN"/>
+            </a:p>
+          </p:txBody>
+        </p:sp>
+        <p:grpSp>
+          <p:nvGrpSpPr>
+            <p:cNvPr id="55" name="Group 54"/>
+            <p:cNvGrpSpPr/>
+            <p:nvPr/>
+          </p:nvGrpSpPr>
+          <p:grpSpPr>
+            <a:xfrm rot="11459565">
+              <a:off x="3606016" y="3936710"/>
+              <a:ext cx="1131017" cy="887503"/>
+              <a:chOff x="1578004" y="2605150"/>
+              <a:chExt cx="1131017" cy="887503"/>
+            </a:xfrm>
+          </p:grpSpPr>
+          <p:sp>
+            <p:nvSpPr>
+              <p:cNvPr id="56" name="Rounded Rectangle 55"/>
+              <p:cNvSpPr/>
+              <p:nvPr/>
+            </p:nvSpPr>
+            <p:spPr>
+              <a:xfrm rot="1660258">
+                <a:off x="1578004" y="2605150"/>
+                <a:ext cx="1131017" cy="887503"/>
+              </a:xfrm>
+              <a:prstGeom prst="roundRect">
+                <a:avLst>
+                  <a:gd name="adj" fmla="val 50000"/>
+                </a:avLst>
+              </a:prstGeom>
+              <a:solidFill>
+                <a:schemeClr val="accent2">
+                  <a:lumMod val="75000"/>
+                </a:schemeClr>
+              </a:solidFill>
+              <a:ln>
+                <a:noFill/>
+              </a:ln>
+            </p:spPr>
+            <p:style>
+              <a:lnRef idx="2">
+                <a:schemeClr val="accent1">
+                  <a:shade val="50000"/>
+                </a:schemeClr>
+              </a:lnRef>
+              <a:fillRef idx="1">
+                <a:schemeClr val="accent1"/>
+              </a:fillRef>
+              <a:effectRef idx="0">
+                <a:schemeClr val="accent1"/>
+              </a:effectRef>
+              <a:fontRef idx="minor">
+                <a:schemeClr val="lt1"/>
+              </a:fontRef>
+            </p:style>
+            <p:txBody>
+              <a:bodyPr rtlCol="0" anchor="ctr"/>
+              <a:lstStyle/>
+              <a:p>
+                <a:pPr algn="ctr"/>
+                <a:endParaRPr lang="en-IN"/>
+              </a:p>
+            </p:txBody>
+          </p:sp>
+          <p:sp>
+            <p:nvSpPr>
+              <p:cNvPr id="57" name="Oval 56"/>
+              <p:cNvSpPr/>
+              <p:nvPr/>
+            </p:nvSpPr>
+            <p:spPr>
+              <a:xfrm>
+                <a:off x="1688088" y="2670298"/>
+                <a:ext cx="576112" cy="576112"/>
+              </a:xfrm>
+              <a:prstGeom prst="ellipse">
+                <a:avLst/>
+              </a:prstGeom>
+              <a:solidFill>
+                <a:schemeClr val="accent2">
+                  <a:lumMod val="40000"/>
+                  <a:lumOff val="60000"/>
+                </a:schemeClr>
+              </a:solidFill>
+              <a:ln>
+                <a:noFill/>
+              </a:ln>
+            </p:spPr>
+            <p:style>
+              <a:lnRef idx="2">
+                <a:schemeClr val="accent1">
+                  <a:shade val="50000"/>
+                </a:schemeClr>
+              </a:lnRef>
+              <a:fillRef idx="1">
+                <a:schemeClr val="accent1"/>
+              </a:fillRef>
+              <a:effectRef idx="0">
+                <a:schemeClr val="accent1"/>
+              </a:effectRef>
+              <a:fontRef idx="minor">
+                <a:schemeClr val="lt1"/>
+              </a:fontRef>
+            </p:style>
+            <p:txBody>
+              <a:bodyPr rtlCol="0" anchor="ctr"/>
+              <a:lstStyle/>
+              <a:p>
+                <a:pPr algn="ctr"/>
+                <a:endParaRPr lang="en-IN"/>
+              </a:p>
+            </p:txBody>
+          </p:sp>
+        </p:grpSp>
+        <p:grpSp>
+          <p:nvGrpSpPr>
+            <p:cNvPr id="49" name="Group 48"/>
+            <p:cNvGrpSpPr/>
+            <p:nvPr/>
+          </p:nvGrpSpPr>
+          <p:grpSpPr>
+            <a:xfrm rot="17724576">
+              <a:off x="1774301" y="3961978"/>
+              <a:ext cx="1131017" cy="887503"/>
+              <a:chOff x="1578004" y="2605150"/>
+              <a:chExt cx="1131017" cy="887503"/>
+            </a:xfrm>
+          </p:grpSpPr>
+          <p:sp>
+            <p:nvSpPr>
+              <p:cNvPr id="50" name="Rounded Rectangle 49"/>
+              <p:cNvSpPr/>
+              <p:nvPr/>
+            </p:nvSpPr>
+            <p:spPr>
+              <a:xfrm rot="1660258">
+                <a:off x="1578004" y="2605150"/>
+                <a:ext cx="1131017" cy="887503"/>
+              </a:xfrm>
+              <a:prstGeom prst="roundRect">
+                <a:avLst>
+                  <a:gd name="adj" fmla="val 50000"/>
+                </a:avLst>
+              </a:prstGeom>
+              <a:solidFill>
+                <a:schemeClr val="accent2">
+                  <a:lumMod val="75000"/>
+                </a:schemeClr>
+              </a:solidFill>
+              <a:ln>
+                <a:noFill/>
+              </a:ln>
+            </p:spPr>
+            <p:style>
+              <a:lnRef idx="2">
+                <a:schemeClr val="accent1">
+                  <a:shade val="50000"/>
+                </a:schemeClr>
+              </a:lnRef>
+              <a:fillRef idx="1">
+                <a:schemeClr val="accent1"/>
+              </a:fillRef>
+              <a:effectRef idx="0">
+                <a:schemeClr val="accent1"/>
+              </a:effectRef>
+              <a:fontRef idx="minor">
+                <a:schemeClr val="lt1"/>
+              </a:fontRef>
+            </p:style>
+            <p:txBody>
+              <a:bodyPr rtlCol="0" anchor="ctr"/>
+              <a:lstStyle/>
+              <a:p>
+                <a:pPr algn="ctr"/>
+                <a:endParaRPr lang="en-IN"/>
+              </a:p>
+            </p:txBody>
+          </p:sp>
+          <p:sp>
+            <p:nvSpPr>
+              <p:cNvPr id="51" name="Oval 50"/>
+              <p:cNvSpPr/>
+              <p:nvPr/>
+            </p:nvSpPr>
+            <p:spPr>
+              <a:xfrm>
+                <a:off x="1688088" y="2670298"/>
+                <a:ext cx="576112" cy="576112"/>
+              </a:xfrm>
+              <a:prstGeom prst="ellipse">
+                <a:avLst/>
+              </a:prstGeom>
+              <a:solidFill>
+                <a:schemeClr val="accent2">
+                  <a:lumMod val="40000"/>
+                  <a:lumOff val="60000"/>
+                </a:schemeClr>
+              </a:solidFill>
+              <a:ln>
+                <a:noFill/>
+              </a:ln>
+            </p:spPr>
+            <p:style>
+              <a:lnRef idx="2">
+                <a:schemeClr val="accent1">
+                  <a:shade val="50000"/>
+                </a:schemeClr>
+              </a:lnRef>
+              <a:fillRef idx="1">
+                <a:schemeClr val="accent1"/>
+              </a:fillRef>
+              <a:effectRef idx="0">
+                <a:schemeClr val="accent1"/>
+              </a:effectRef>
+              <a:fontRef idx="minor">
+                <a:schemeClr val="lt1"/>
+              </a:fontRef>
+            </p:style>
+            <p:txBody>
+              <a:bodyPr rtlCol="0" anchor="ctr"/>
+              <a:lstStyle/>
+              <a:p>
+                <a:pPr algn="ctr"/>
+                <a:endParaRPr lang="en-IN"/>
+              </a:p>
+            </p:txBody>
+          </p:sp>
+        </p:grpSp>
+        <p:sp>
+          <p:nvSpPr>
+            <p:cNvPr id="43" name="Oval 42"/>
+            <p:cNvSpPr/>
+            <p:nvPr/>
+          </p:nvSpPr>
+          <p:spPr>
+            <a:xfrm>
+              <a:off x="2171140" y="2426752"/>
+              <a:ext cx="2192988" cy="2192988"/>
+            </a:xfrm>
+            <a:prstGeom prst="ellipse">
+              <a:avLst/>
+            </a:prstGeom>
+            <a:solidFill>
+              <a:schemeClr val="accent2">
+                <a:lumMod val="75000"/>
+              </a:schemeClr>
+            </a:solidFill>
+            <a:ln>
+              <a:noFill/>
+            </a:ln>
+          </p:spPr>
+          <p:style>
+            <a:lnRef idx="2">
+              <a:schemeClr val="accent1">
+                <a:shade val="50000"/>
+              </a:schemeClr>
+            </a:lnRef>
+            <a:fillRef idx="1">
+              <a:schemeClr val="accent1"/>
+            </a:fillRef>
+            <a:effectRef idx="0">
+              <a:schemeClr val="accent1"/>
+            </a:effectRef>
+            <a:fontRef idx="minor">
+              <a:schemeClr val="lt1"/>
+            </a:fontRef>
+          </p:style>
+          <p:txBody>
+            <a:bodyPr rtlCol="0" anchor="ctr"/>
+            <a:lstStyle/>
+            <a:p>
+              <a:pPr algn="ctr"/>
+              <a:endParaRPr lang="en-IN"/>
+            </a:p>
+          </p:txBody>
+        </p:sp>
+        <p:sp>
+          <p:nvSpPr>
+            <p:cNvPr id="40" name="Isosceles Triangle 39"/>
+            <p:cNvSpPr/>
+            <p:nvPr/>
+          </p:nvSpPr>
+          <p:spPr>
+            <a:xfrm>
+              <a:off x="2851950" y="1830568"/>
+              <a:ext cx="884916" cy="869315"/>
+            </a:xfrm>
+            <a:custGeom>
+              <a:avLst/>
+              <a:gdLst>
+                <a:gd name="connsiteX0" fmla="*/ 0 w 2573769"/>
+                <a:gd name="connsiteY0" fmla="*/ 2218766 h 2218766"/>
+                <a:gd name="connsiteX1" fmla="*/ 1286885 w 2573769"/>
+                <a:gd name="connsiteY1" fmla="*/ 0 h 2218766"/>
+                <a:gd name="connsiteX2" fmla="*/ 2573769 w 2573769"/>
+                <a:gd name="connsiteY2" fmla="*/ 2218766 h 2218766"/>
+                <a:gd name="connsiteX3" fmla="*/ 0 w 2573769"/>
+                <a:gd name="connsiteY3" fmla="*/ 2218766 h 2218766"/>
+                <a:gd name="connsiteX0" fmla="*/ 0 w 2573769"/>
+                <a:gd name="connsiteY0" fmla="*/ 2191872 h 2191872"/>
+                <a:gd name="connsiteX1" fmla="*/ 1286885 w 2573769"/>
+                <a:gd name="connsiteY1" fmla="*/ 0 h 2191872"/>
+                <a:gd name="connsiteX2" fmla="*/ 2573769 w 2573769"/>
+                <a:gd name="connsiteY2" fmla="*/ 2191872 h 2191872"/>
+                <a:gd name="connsiteX3" fmla="*/ 0 w 2573769"/>
+                <a:gd name="connsiteY3" fmla="*/ 2191872 h 2191872"/>
+                <a:gd name="connsiteX0" fmla="*/ 0 w 2573769"/>
+                <a:gd name="connsiteY0" fmla="*/ 2191872 h 2191872"/>
+                <a:gd name="connsiteX1" fmla="*/ 1286885 w 2573769"/>
+                <a:gd name="connsiteY1" fmla="*/ 0 h 2191872"/>
+                <a:gd name="connsiteX2" fmla="*/ 2573769 w 2573769"/>
+                <a:gd name="connsiteY2" fmla="*/ 2191872 h 2191872"/>
+                <a:gd name="connsiteX3" fmla="*/ 0 w 2573769"/>
+                <a:gd name="connsiteY3" fmla="*/ 2191872 h 2191872"/>
+                <a:gd name="connsiteX0" fmla="*/ 0 w 2573769"/>
+                <a:gd name="connsiteY0" fmla="*/ 2191882 h 2191882"/>
+                <a:gd name="connsiteX1" fmla="*/ 1286885 w 2573769"/>
+                <a:gd name="connsiteY1" fmla="*/ 10 h 2191882"/>
+                <a:gd name="connsiteX2" fmla="*/ 2573769 w 2573769"/>
+                <a:gd name="connsiteY2" fmla="*/ 2191882 h 2191882"/>
+                <a:gd name="connsiteX3" fmla="*/ 0 w 2573769"/>
+                <a:gd name="connsiteY3" fmla="*/ 2191882 h 2191882"/>
+                <a:gd name="connsiteX0" fmla="*/ 48203 w 2621972"/>
+                <a:gd name="connsiteY0" fmla="*/ 2191882 h 2462815"/>
+                <a:gd name="connsiteX1" fmla="*/ 1335088 w 2621972"/>
+                <a:gd name="connsiteY1" fmla="*/ 10 h 2462815"/>
+                <a:gd name="connsiteX2" fmla="*/ 2621972 w 2621972"/>
+                <a:gd name="connsiteY2" fmla="*/ 2191882 h 2462815"/>
+                <a:gd name="connsiteX3" fmla="*/ 48203 w 2621972"/>
+                <a:gd name="connsiteY3" fmla="*/ 2191882 h 2462815"/>
+                <a:gd name="connsiteX0" fmla="*/ 48203 w 2651690"/>
+                <a:gd name="connsiteY0" fmla="*/ 2191882 h 2604941"/>
+                <a:gd name="connsiteX1" fmla="*/ 1335088 w 2651690"/>
+                <a:gd name="connsiteY1" fmla="*/ 10 h 2604941"/>
+                <a:gd name="connsiteX2" fmla="*/ 2621972 w 2651690"/>
+                <a:gd name="connsiteY2" fmla="*/ 2191882 h 2604941"/>
+                <a:gd name="connsiteX3" fmla="*/ 48203 w 2651690"/>
+                <a:gd name="connsiteY3" fmla="*/ 2191882 h 2604941"/>
+              </a:gdLst>
+              <a:ahLst/>
+              <a:cxnLst>
+                <a:cxn ang="0">
+                  <a:pos x="connsiteX0" y="connsiteY0"/>
+                </a:cxn>
+                <a:cxn ang="0">
+                  <a:pos x="connsiteX1" y="connsiteY1"/>
+                </a:cxn>
+                <a:cxn ang="0">
+                  <a:pos x="connsiteX2" y="connsiteY2"/>
+                </a:cxn>
+                <a:cxn ang="0">
+                  <a:pos x="connsiteX3" y="connsiteY3"/>
+                </a:cxn>
+              </a:cxnLst>
+              <a:rect l="l" t="t" r="r" b="b"/>
+              <a:pathLst>
+                <a:path w="2651690" h="2604941">
+                  <a:moveTo>
+                    <a:pt x="48203" y="2191882"/>
+                  </a:moveTo>
+                  <a:cubicBezTo>
+                    <a:pt x="-208635" y="1582281"/>
+                    <a:pt x="610292" y="-4472"/>
+                    <a:pt x="1335088" y="10"/>
+                  </a:cubicBezTo>
+                  <a:cubicBezTo>
+                    <a:pt x="2059884" y="4492"/>
+                    <a:pt x="2811576" y="1703305"/>
+                    <a:pt x="2621972" y="2191882"/>
+                  </a:cubicBezTo>
+                  <a:cubicBezTo>
+                    <a:pt x="2432368" y="2680459"/>
+                    <a:pt x="305041" y="2801483"/>
+                    <a:pt x="48203" y="2191882"/>
+                  </a:cubicBezTo>
+                  <a:close/>
+                </a:path>
+              </a:pathLst>
+            </a:custGeom>
+            <a:solidFill>
+              <a:schemeClr val="bg1"/>
+            </a:solidFill>
+            <a:ln>
+              <a:noFill/>
+            </a:ln>
+          </p:spPr>
+          <p:style>
+            <a:lnRef idx="2">
+              <a:schemeClr val="accent1">
+                <a:shade val="50000"/>
+              </a:schemeClr>
+            </a:lnRef>
+            <a:fillRef idx="1">
+              <a:schemeClr val="accent1"/>
+            </a:fillRef>
+            <a:effectRef idx="0">
+              <a:schemeClr val="accent1"/>
+            </a:effectRef>
+            <a:fontRef idx="minor">
+              <a:schemeClr val="lt1"/>
+            </a:fontRef>
+          </p:style>
+          <p:txBody>
+            <a:bodyPr rtlCol="0" anchor="ctr"/>
+            <a:lstStyle/>
+            <a:p>
+              <a:pPr algn="ctr"/>
+              <a:endParaRPr lang="en-IN"/>
+            </a:p>
+          </p:txBody>
+        </p:sp>
+        <p:sp>
+          <p:nvSpPr>
+            <p:cNvPr id="5" name="Oval 4"/>
+            <p:cNvSpPr/>
+            <p:nvPr/>
+          </p:nvSpPr>
+          <p:spPr>
+            <a:xfrm>
+              <a:off x="2248180" y="1060077"/>
+              <a:ext cx="735106" cy="735106"/>
+            </a:xfrm>
+            <a:prstGeom prst="ellipse">
+              <a:avLst/>
+            </a:prstGeom>
+            <a:solidFill>
+              <a:schemeClr val="accent2">
+                <a:lumMod val="75000"/>
+              </a:schemeClr>
+            </a:solidFill>
+            <a:ln>
+              <a:noFill/>
+            </a:ln>
+          </p:spPr>
+          <p:style>
+            <a:lnRef idx="2">
+              <a:schemeClr val="accent1">
+                <a:shade val="50000"/>
+              </a:schemeClr>
+            </a:lnRef>
+            <a:fillRef idx="1">
+              <a:schemeClr val="accent1"/>
+            </a:fillRef>
+            <a:effectRef idx="0">
+              <a:schemeClr val="accent1"/>
+            </a:effectRef>
+            <a:fontRef idx="minor">
+              <a:schemeClr val="lt1"/>
+            </a:fontRef>
+          </p:style>
+          <p:txBody>
+            <a:bodyPr rtlCol="0" anchor="ctr"/>
+            <a:lstStyle/>
+            <a:p>
+              <a:pPr algn="ctr"/>
+              <a:endParaRPr lang="en-IN"/>
+            </a:p>
+          </p:txBody>
+        </p:sp>
+        <p:sp>
+          <p:nvSpPr>
+            <p:cNvPr id="11" name="Oval 10"/>
+            <p:cNvSpPr/>
+            <p:nvPr/>
+          </p:nvSpPr>
+          <p:spPr>
+            <a:xfrm>
+              <a:off x="3582091" y="1835156"/>
+              <a:ext cx="231962" cy="242048"/>
+            </a:xfrm>
+            <a:prstGeom prst="ellipse">
+              <a:avLst/>
+            </a:prstGeom>
+            <a:solidFill>
+              <a:schemeClr val="tx1"/>
+            </a:solidFill>
+            <a:ln>
+              <a:noFill/>
+            </a:ln>
+          </p:spPr>
+          <p:style>
+            <a:lnRef idx="2">
+              <a:schemeClr val="accent1">
+                <a:shade val="50000"/>
+              </a:schemeClr>
+            </a:lnRef>
+            <a:fillRef idx="1">
+              <a:schemeClr val="accent1"/>
+            </a:fillRef>
+            <a:effectRef idx="0">
+              <a:schemeClr val="accent1"/>
+            </a:effectRef>
+            <a:fontRef idx="minor">
+              <a:schemeClr val="lt1"/>
+            </a:fontRef>
+          </p:style>
+          <p:txBody>
+            <a:bodyPr rtlCol="0" anchor="ctr"/>
+            <a:lstStyle/>
+            <a:p>
+              <a:pPr algn="ctr"/>
+              <a:endParaRPr lang="en-IN"/>
+            </a:p>
+          </p:txBody>
+        </p:sp>
+        <p:sp>
+          <p:nvSpPr>
+            <p:cNvPr id="12" name="Oval 11"/>
+            <p:cNvSpPr/>
+            <p:nvPr/>
+          </p:nvSpPr>
+          <p:spPr>
+            <a:xfrm>
+              <a:off x="2692076" y="1825070"/>
+              <a:ext cx="211630" cy="219636"/>
+            </a:xfrm>
+            <a:prstGeom prst="ellipse">
+              <a:avLst/>
+            </a:prstGeom>
+            <a:solidFill>
+              <a:schemeClr val="tx1"/>
+            </a:solidFill>
+            <a:ln>
+              <a:noFill/>
+            </a:ln>
+          </p:spPr>
+          <p:style>
+            <a:lnRef idx="2">
+              <a:schemeClr val="accent1">
+                <a:shade val="50000"/>
+              </a:schemeClr>
+            </a:lnRef>
+            <a:fillRef idx="1">
+              <a:schemeClr val="accent1"/>
+            </a:fillRef>
+            <a:effectRef idx="0">
+              <a:schemeClr val="accent1"/>
+            </a:effectRef>
+            <a:fontRef idx="minor">
+              <a:schemeClr val="lt1"/>
+            </a:fontRef>
+          </p:style>
+          <p:txBody>
+            <a:bodyPr rtlCol="0" anchor="ctr"/>
+            <a:lstStyle/>
+            <a:p>
+              <a:pPr algn="ctr"/>
+              <a:endParaRPr lang="en-IN"/>
+            </a:p>
+          </p:txBody>
+        </p:sp>
+        <p:sp>
+          <p:nvSpPr>
+            <p:cNvPr id="13" name="Oval 12"/>
+            <p:cNvSpPr/>
+            <p:nvPr/>
+          </p:nvSpPr>
+          <p:spPr>
+            <a:xfrm>
+              <a:off x="3629022" y="1075765"/>
+              <a:ext cx="735106" cy="735106"/>
+            </a:xfrm>
+            <a:prstGeom prst="ellipse">
+              <a:avLst/>
+            </a:prstGeom>
+            <a:solidFill>
+              <a:schemeClr val="accent2">
+                <a:lumMod val="75000"/>
+              </a:schemeClr>
+            </a:solidFill>
+            <a:ln>
+              <a:noFill/>
+            </a:ln>
+          </p:spPr>
+          <p:style>
+            <a:lnRef idx="2">
+              <a:schemeClr val="accent1">
+                <a:shade val="50000"/>
+              </a:schemeClr>
+            </a:lnRef>
+            <a:fillRef idx="1">
+              <a:schemeClr val="accent1"/>
+            </a:fillRef>
+            <a:effectRef idx="0">
+              <a:schemeClr val="accent1"/>
+            </a:effectRef>
+            <a:fontRef idx="minor">
+              <a:schemeClr val="lt1"/>
+            </a:fontRef>
+          </p:style>
+          <p:txBody>
+            <a:bodyPr rtlCol="0" anchor="ctr"/>
+            <a:lstStyle/>
+            <a:p>
+              <a:pPr algn="ctr"/>
+              <a:endParaRPr lang="en-IN"/>
+            </a:p>
+          </p:txBody>
+        </p:sp>
+        <p:sp>
+          <p:nvSpPr>
+            <p:cNvPr id="23" name="Arc 22"/>
+            <p:cNvSpPr/>
+            <p:nvPr/>
+          </p:nvSpPr>
+          <p:spPr>
+            <a:xfrm rot="8250898">
+              <a:off x="3012697" y="2013640"/>
+              <a:ext cx="656364" cy="576410"/>
+            </a:xfrm>
+            <a:prstGeom prst="arc">
+              <a:avLst/>
+            </a:prstGeom>
+            <a:noFill/>
+            <a:ln>
+              <a:solidFill>
+                <a:schemeClr val="tx1"/>
+              </a:solidFill>
+            </a:ln>
+          </p:spPr>
+          <p:style>
+            <a:lnRef idx="1">
+              <a:schemeClr val="accent1"/>
+            </a:lnRef>
+            <a:fillRef idx="0">
+              <a:schemeClr val="accent1"/>
+            </a:fillRef>
+            <a:effectRef idx="0">
+              <a:schemeClr val="accent1"/>
+            </a:effectRef>
+            <a:fontRef idx="minor">
+              <a:schemeClr val="tx1"/>
+            </a:fontRef>
+          </p:style>
+          <p:txBody>
+            <a:bodyPr rtlCol="0" anchor="ctr"/>
+            <a:lstStyle/>
+            <a:p>
+              <a:pPr algn="ctr"/>
+              <a:endParaRPr lang="en-IN"/>
+            </a:p>
+          </p:txBody>
+        </p:sp>
+        <p:sp>
+          <p:nvSpPr>
+            <p:cNvPr id="38" name="Chord 37"/>
+            <p:cNvSpPr/>
+            <p:nvPr/>
+          </p:nvSpPr>
+          <p:spPr>
+            <a:xfrm rot="3871589">
+              <a:off x="2409504" y="1222584"/>
+              <a:ext cx="338082" cy="338082"/>
+            </a:xfrm>
+            <a:prstGeom prst="chord">
+              <a:avLst/>
+            </a:prstGeom>
+            <a:solidFill>
+              <a:schemeClr val="accent2">
+                <a:lumMod val="40000"/>
+                <a:lumOff val="60000"/>
+              </a:schemeClr>
+            </a:solidFill>
+            <a:ln>
+              <a:noFill/>
+            </a:ln>
+          </p:spPr>
+          <p:style>
+            <a:lnRef idx="2">
+              <a:schemeClr val="accent1">
+                <a:shade val="50000"/>
+              </a:schemeClr>
+            </a:lnRef>
+            <a:fillRef idx="1">
+              <a:schemeClr val="accent1"/>
+            </a:fillRef>
+            <a:effectRef idx="0">
+              <a:schemeClr val="accent1"/>
+            </a:effectRef>
+            <a:fontRef idx="minor">
+              <a:schemeClr val="lt1"/>
+            </a:fontRef>
+          </p:style>
+          <p:txBody>
+            <a:bodyPr rtlCol="0" anchor="ctr"/>
+            <a:lstStyle/>
+            <a:p>
+              <a:pPr algn="ctr"/>
+              <a:endParaRPr lang="en-IN"/>
+            </a:p>
+          </p:txBody>
+        </p:sp>
+        <p:sp>
+          <p:nvSpPr>
+            <p:cNvPr id="39" name="Chord 38"/>
+            <p:cNvSpPr/>
+            <p:nvPr/>
+          </p:nvSpPr>
+          <p:spPr>
+            <a:xfrm rot="9823045">
+              <a:off x="3851520" y="1227212"/>
+              <a:ext cx="338082" cy="338082"/>
+            </a:xfrm>
+            <a:prstGeom prst="chord">
+              <a:avLst/>
+            </a:prstGeom>
+            <a:solidFill>
+              <a:schemeClr val="accent2">
+                <a:lumMod val="40000"/>
+                <a:lumOff val="60000"/>
+              </a:schemeClr>
+            </a:solidFill>
+            <a:ln>
+              <a:noFill/>
+            </a:ln>
+          </p:spPr>
+          <p:style>
+            <a:lnRef idx="2">
+              <a:schemeClr val="accent1">
+                <a:shade val="50000"/>
+              </a:schemeClr>
+            </a:lnRef>
+            <a:fillRef idx="1">
+              <a:schemeClr val="accent1"/>
+            </a:fillRef>
+            <a:effectRef idx="0">
+              <a:schemeClr val="accent1"/>
+            </a:effectRef>
+            <a:fontRef idx="minor">
+              <a:schemeClr val="lt1"/>
+            </a:fontRef>
+          </p:style>
+          <p:txBody>
+            <a:bodyPr rtlCol="0" anchor="ctr"/>
+            <a:lstStyle/>
+            <a:p>
+              <a:pPr algn="ctr"/>
+              <a:endParaRPr lang="en-IN"/>
+            </a:p>
+          </p:txBody>
+        </p:sp>
+        <p:grpSp>
+          <p:nvGrpSpPr>
+            <p:cNvPr id="48" name="Group 47"/>
+            <p:cNvGrpSpPr/>
+            <p:nvPr/>
+          </p:nvGrpSpPr>
+          <p:grpSpPr>
+            <a:xfrm>
+              <a:off x="1644250" y="2676275"/>
+              <a:ext cx="1131017" cy="887503"/>
+              <a:chOff x="1578004" y="2605150"/>
+              <a:chExt cx="1131017" cy="887503"/>
+            </a:xfrm>
+          </p:grpSpPr>
+          <p:sp>
+            <p:nvSpPr>
+              <p:cNvPr id="45" name="Rounded Rectangle 44"/>
+              <p:cNvSpPr/>
+              <p:nvPr/>
+            </p:nvSpPr>
+            <p:spPr>
+              <a:xfrm rot="1660258">
+                <a:off x="1578004" y="2605150"/>
+                <a:ext cx="1131017" cy="887503"/>
+              </a:xfrm>
+              <a:prstGeom prst="roundRect">
+                <a:avLst>
+                  <a:gd name="adj" fmla="val 50000"/>
+                </a:avLst>
+              </a:prstGeom>
+              <a:solidFill>
+                <a:schemeClr val="accent2">
+                  <a:lumMod val="75000"/>
+                </a:schemeClr>
+              </a:solidFill>
+              <a:ln>
+                <a:noFill/>
+              </a:ln>
+            </p:spPr>
+            <p:style>
+              <a:lnRef idx="2">
+                <a:schemeClr val="accent1">
+                  <a:shade val="50000"/>
+                </a:schemeClr>
+              </a:lnRef>
+              <a:fillRef idx="1">
+                <a:schemeClr val="accent1"/>
+              </a:fillRef>
+              <a:effectRef idx="0">
+                <a:schemeClr val="accent1"/>
+              </a:effectRef>
+              <a:fontRef idx="minor">
+                <a:schemeClr val="lt1"/>
+              </a:fontRef>
+            </p:style>
+            <p:txBody>
+              <a:bodyPr rtlCol="0" anchor="ctr"/>
+              <a:lstStyle/>
+              <a:p>
+                <a:pPr algn="ctr"/>
+                <a:endParaRPr lang="en-IN"/>
+              </a:p>
+            </p:txBody>
+          </p:sp>
+          <p:sp>
+            <p:nvSpPr>
+              <p:cNvPr id="47" name="Oval 46"/>
+              <p:cNvSpPr/>
+              <p:nvPr/>
+            </p:nvSpPr>
+            <p:spPr>
+              <a:xfrm>
+                <a:off x="1688088" y="2670298"/>
+                <a:ext cx="576112" cy="576112"/>
+              </a:xfrm>
+              <a:prstGeom prst="ellipse">
+                <a:avLst/>
+              </a:prstGeom>
+              <a:solidFill>
+                <a:schemeClr val="accent2">
+                  <a:lumMod val="40000"/>
+                  <a:lumOff val="60000"/>
+                </a:schemeClr>
+              </a:solidFill>
+              <a:ln>
+                <a:noFill/>
+              </a:ln>
+            </p:spPr>
+            <p:style>
+              <a:lnRef idx="2">
+                <a:schemeClr val="accent1">
+                  <a:shade val="50000"/>
+                </a:schemeClr>
+              </a:lnRef>
+              <a:fillRef idx="1">
+                <a:schemeClr val="accent1"/>
+              </a:fillRef>
+              <a:effectRef idx="0">
+                <a:schemeClr val="accent1"/>
+              </a:effectRef>
+              <a:fontRef idx="minor">
+                <a:schemeClr val="lt1"/>
+              </a:fontRef>
+            </p:style>
+            <p:txBody>
+              <a:bodyPr rtlCol="0" anchor="ctr"/>
+              <a:lstStyle/>
+              <a:p>
+                <a:pPr algn="ctr"/>
+                <a:endParaRPr lang="en-IN"/>
+              </a:p>
+            </p:txBody>
+          </p:sp>
+        </p:grpSp>
+        <p:grpSp>
+          <p:nvGrpSpPr>
+            <p:cNvPr id="52" name="Group 51"/>
+            <p:cNvGrpSpPr/>
+            <p:nvPr/>
+          </p:nvGrpSpPr>
+          <p:grpSpPr>
+            <a:xfrm rot="7199425">
+              <a:off x="3784511" y="2627712"/>
+              <a:ext cx="1131017" cy="887503"/>
+              <a:chOff x="1578004" y="2605150"/>
+              <a:chExt cx="1131017" cy="887503"/>
+            </a:xfrm>
+          </p:grpSpPr>
+          <p:sp>
+            <p:nvSpPr>
+              <p:cNvPr id="53" name="Rounded Rectangle 52"/>
+              <p:cNvSpPr/>
+              <p:nvPr/>
+            </p:nvSpPr>
+            <p:spPr>
+              <a:xfrm rot="1660258">
+                <a:off x="1578004" y="2605150"/>
+                <a:ext cx="1131017" cy="887503"/>
+              </a:xfrm>
+              <a:prstGeom prst="roundRect">
+                <a:avLst>
+                  <a:gd name="adj" fmla="val 50000"/>
+                </a:avLst>
+              </a:prstGeom>
+              <a:solidFill>
+                <a:schemeClr val="accent2">
+                  <a:lumMod val="75000"/>
+                </a:schemeClr>
+              </a:solidFill>
+              <a:ln>
+                <a:noFill/>
+              </a:ln>
+            </p:spPr>
+            <p:style>
+              <a:lnRef idx="2">
+                <a:schemeClr val="accent1">
+                  <a:shade val="50000"/>
+                </a:schemeClr>
+              </a:lnRef>
+              <a:fillRef idx="1">
+                <a:schemeClr val="accent1"/>
+              </a:fillRef>
+              <a:effectRef idx="0">
+                <a:schemeClr val="accent1"/>
+              </a:effectRef>
+              <a:fontRef idx="minor">
+                <a:schemeClr val="lt1"/>
+              </a:fontRef>
+            </p:style>
+            <p:txBody>
+              <a:bodyPr rtlCol="0" anchor="ctr"/>
+              <a:lstStyle/>
+              <a:p>
+                <a:pPr algn="ctr"/>
+                <a:endParaRPr lang="en-IN"/>
+              </a:p>
+            </p:txBody>
+          </p:sp>
+          <p:sp>
+            <p:nvSpPr>
+              <p:cNvPr id="54" name="Oval 53"/>
+              <p:cNvSpPr/>
+              <p:nvPr/>
+            </p:nvSpPr>
+            <p:spPr>
+              <a:xfrm>
+                <a:off x="1688088" y="2670298"/>
+                <a:ext cx="576112" cy="576112"/>
+              </a:xfrm>
+              <a:prstGeom prst="ellipse">
+                <a:avLst/>
+              </a:prstGeom>
+              <a:solidFill>
+                <a:schemeClr val="accent2">
+                  <a:lumMod val="40000"/>
+                  <a:lumOff val="60000"/>
+                </a:schemeClr>
+              </a:solidFill>
+              <a:ln>
+                <a:noFill/>
+              </a:ln>
+            </p:spPr>
+            <p:style>
+              <a:lnRef idx="2">
+                <a:schemeClr val="accent1">
+                  <a:shade val="50000"/>
+                </a:schemeClr>
+              </a:lnRef>
+              <a:fillRef idx="1">
+                <a:schemeClr val="accent1"/>
+              </a:fillRef>
+              <a:effectRef idx="0">
+                <a:schemeClr val="accent1"/>
+              </a:effectRef>
+              <a:fontRef idx="minor">
+                <a:schemeClr val="lt1"/>
+              </a:fontRef>
+            </p:style>
+            <p:txBody>
+              <a:bodyPr rtlCol="0" anchor="ctr"/>
+              <a:lstStyle/>
+              <a:p>
+                <a:pPr algn="ctr"/>
+                <a:endParaRPr lang="en-IN"/>
+              </a:p>
+            </p:txBody>
+          </p:sp>
+        </p:grpSp>
+        <p:sp>
+          <p:nvSpPr>
+            <p:cNvPr id="59" name="Isosceles Triangle 39"/>
+            <p:cNvSpPr/>
+            <p:nvPr/>
+          </p:nvSpPr>
+          <p:spPr>
+            <a:xfrm flipV="1">
+              <a:off x="3052682" y="2014843"/>
+              <a:ext cx="481852" cy="345018"/>
+            </a:xfrm>
+            <a:custGeom>
+              <a:avLst/>
+              <a:gdLst>
+                <a:gd name="connsiteX0" fmla="*/ 0 w 2573769"/>
+                <a:gd name="connsiteY0" fmla="*/ 2218766 h 2218766"/>
+                <a:gd name="connsiteX1" fmla="*/ 1286885 w 2573769"/>
+                <a:gd name="connsiteY1" fmla="*/ 0 h 2218766"/>
+                <a:gd name="connsiteX2" fmla="*/ 2573769 w 2573769"/>
+                <a:gd name="connsiteY2" fmla="*/ 2218766 h 2218766"/>
+                <a:gd name="connsiteX3" fmla="*/ 0 w 2573769"/>
+                <a:gd name="connsiteY3" fmla="*/ 2218766 h 2218766"/>
+                <a:gd name="connsiteX0" fmla="*/ 0 w 2573769"/>
+                <a:gd name="connsiteY0" fmla="*/ 2191872 h 2191872"/>
+                <a:gd name="connsiteX1" fmla="*/ 1286885 w 2573769"/>
+                <a:gd name="connsiteY1" fmla="*/ 0 h 2191872"/>
+                <a:gd name="connsiteX2" fmla="*/ 2573769 w 2573769"/>
+                <a:gd name="connsiteY2" fmla="*/ 2191872 h 2191872"/>
+                <a:gd name="connsiteX3" fmla="*/ 0 w 2573769"/>
+                <a:gd name="connsiteY3" fmla="*/ 2191872 h 2191872"/>
+                <a:gd name="connsiteX0" fmla="*/ 0 w 2573769"/>
+                <a:gd name="connsiteY0" fmla="*/ 2191872 h 2191872"/>
+                <a:gd name="connsiteX1" fmla="*/ 1286885 w 2573769"/>
+                <a:gd name="connsiteY1" fmla="*/ 0 h 2191872"/>
+                <a:gd name="connsiteX2" fmla="*/ 2573769 w 2573769"/>
+                <a:gd name="connsiteY2" fmla="*/ 2191872 h 2191872"/>
+                <a:gd name="connsiteX3" fmla="*/ 0 w 2573769"/>
+                <a:gd name="connsiteY3" fmla="*/ 2191872 h 2191872"/>
+                <a:gd name="connsiteX0" fmla="*/ 0 w 2573769"/>
+                <a:gd name="connsiteY0" fmla="*/ 2191882 h 2191882"/>
+                <a:gd name="connsiteX1" fmla="*/ 1286885 w 2573769"/>
+                <a:gd name="connsiteY1" fmla="*/ 10 h 2191882"/>
+                <a:gd name="connsiteX2" fmla="*/ 2573769 w 2573769"/>
+                <a:gd name="connsiteY2" fmla="*/ 2191882 h 2191882"/>
+                <a:gd name="connsiteX3" fmla="*/ 0 w 2573769"/>
+                <a:gd name="connsiteY3" fmla="*/ 2191882 h 2191882"/>
+                <a:gd name="connsiteX0" fmla="*/ 48203 w 2621972"/>
+                <a:gd name="connsiteY0" fmla="*/ 2191882 h 2462815"/>
+                <a:gd name="connsiteX1" fmla="*/ 1335088 w 2621972"/>
+                <a:gd name="connsiteY1" fmla="*/ 10 h 2462815"/>
+                <a:gd name="connsiteX2" fmla="*/ 2621972 w 2621972"/>
+                <a:gd name="connsiteY2" fmla="*/ 2191882 h 2462815"/>
+                <a:gd name="connsiteX3" fmla="*/ 48203 w 2621972"/>
+                <a:gd name="connsiteY3" fmla="*/ 2191882 h 2462815"/>
+                <a:gd name="connsiteX0" fmla="*/ 48203 w 2651690"/>
+                <a:gd name="connsiteY0" fmla="*/ 2191882 h 2604941"/>
+                <a:gd name="connsiteX1" fmla="*/ 1335088 w 2651690"/>
+                <a:gd name="connsiteY1" fmla="*/ 10 h 2604941"/>
+                <a:gd name="connsiteX2" fmla="*/ 2621972 w 2651690"/>
+                <a:gd name="connsiteY2" fmla="*/ 2191882 h 2604941"/>
+                <a:gd name="connsiteX3" fmla="*/ 48203 w 2651690"/>
+                <a:gd name="connsiteY3" fmla="*/ 2191882 h 2604941"/>
+              </a:gdLst>
+              <a:ahLst/>
+              <a:cxnLst>
+                <a:cxn ang="0">
+                  <a:pos x="connsiteX0" y="connsiteY0"/>
+                </a:cxn>
+                <a:cxn ang="0">
+                  <a:pos x="connsiteX1" y="connsiteY1"/>
+                </a:cxn>
+                <a:cxn ang="0">
+                  <a:pos x="connsiteX2" y="connsiteY2"/>
+                </a:cxn>
+                <a:cxn ang="0">
+                  <a:pos x="connsiteX3" y="connsiteY3"/>
+                </a:cxn>
+              </a:cxnLst>
+              <a:rect l="l" t="t" r="r" b="b"/>
+              <a:pathLst>
+                <a:path w="2651690" h="2604941">
+                  <a:moveTo>
+                    <a:pt x="48203" y="2191882"/>
+                  </a:moveTo>
+                  <a:cubicBezTo>
+                    <a:pt x="-208635" y="1582281"/>
+                    <a:pt x="610292" y="-4472"/>
+                    <a:pt x="1335088" y="10"/>
+                  </a:cubicBezTo>
+                  <a:cubicBezTo>
+                    <a:pt x="2059884" y="4492"/>
+                    <a:pt x="2811576" y="1703305"/>
+                    <a:pt x="2621972" y="2191882"/>
+                  </a:cubicBezTo>
+                  <a:cubicBezTo>
+                    <a:pt x="2432368" y="2680459"/>
+                    <a:pt x="305041" y="2801483"/>
+                    <a:pt x="48203" y="2191882"/>
+                  </a:cubicBezTo>
+                  <a:close/>
+                </a:path>
+              </a:pathLst>
+            </a:custGeom>
+            <a:solidFill>
+              <a:schemeClr val="tx1"/>
+            </a:solidFill>
+            <a:ln>
+              <a:noFill/>
+            </a:ln>
+          </p:spPr>
+          <p:style>
+            <a:lnRef idx="2">
+              <a:schemeClr val="accent1">
+                <a:shade val="50000"/>
+              </a:schemeClr>
+            </a:lnRef>
+            <a:fillRef idx="1">
+              <a:schemeClr val="accent1"/>
+            </a:fillRef>
+            <a:effectRef idx="0">
+              <a:schemeClr val="accent1"/>
+            </a:effectRef>
+            <a:fontRef idx="minor">
+              <a:schemeClr val="lt1"/>
+            </a:fontRef>
+          </p:style>
+          <p:txBody>
+            <a:bodyPr rtlCol="0" anchor="ctr"/>
+            <a:lstStyle/>
+            <a:p>
+              <a:pPr algn="ctr"/>
+              <a:endParaRPr lang="en-IN"/>
+            </a:p>
+          </p:txBody>
+        </p:sp>
+        <p:sp>
+          <p:nvSpPr>
+            <p:cNvPr id="61" name="Isosceles Triangle 39"/>
+            <p:cNvSpPr/>
+            <p:nvPr/>
+          </p:nvSpPr>
+          <p:spPr>
+            <a:xfrm>
+              <a:off x="2651345" y="3165054"/>
+              <a:ext cx="1235548" cy="1290820"/>
+            </a:xfrm>
+            <a:custGeom>
+              <a:avLst/>
+              <a:gdLst>
+                <a:gd name="connsiteX0" fmla="*/ 0 w 2573769"/>
+                <a:gd name="connsiteY0" fmla="*/ 2218766 h 2218766"/>
+                <a:gd name="connsiteX1" fmla="*/ 1286885 w 2573769"/>
+                <a:gd name="connsiteY1" fmla="*/ 0 h 2218766"/>
+                <a:gd name="connsiteX2" fmla="*/ 2573769 w 2573769"/>
+                <a:gd name="connsiteY2" fmla="*/ 2218766 h 2218766"/>
+                <a:gd name="connsiteX3" fmla="*/ 0 w 2573769"/>
+                <a:gd name="connsiteY3" fmla="*/ 2218766 h 2218766"/>
+                <a:gd name="connsiteX0" fmla="*/ 0 w 2573769"/>
+                <a:gd name="connsiteY0" fmla="*/ 2191872 h 2191872"/>
+                <a:gd name="connsiteX1" fmla="*/ 1286885 w 2573769"/>
+                <a:gd name="connsiteY1" fmla="*/ 0 h 2191872"/>
+                <a:gd name="connsiteX2" fmla="*/ 2573769 w 2573769"/>
+                <a:gd name="connsiteY2" fmla="*/ 2191872 h 2191872"/>
+                <a:gd name="connsiteX3" fmla="*/ 0 w 2573769"/>
+                <a:gd name="connsiteY3" fmla="*/ 2191872 h 2191872"/>
+                <a:gd name="connsiteX0" fmla="*/ 0 w 2573769"/>
+                <a:gd name="connsiteY0" fmla="*/ 2191872 h 2191872"/>
+                <a:gd name="connsiteX1" fmla="*/ 1286885 w 2573769"/>
+                <a:gd name="connsiteY1" fmla="*/ 0 h 2191872"/>
+                <a:gd name="connsiteX2" fmla="*/ 2573769 w 2573769"/>
+                <a:gd name="connsiteY2" fmla="*/ 2191872 h 2191872"/>
+                <a:gd name="connsiteX3" fmla="*/ 0 w 2573769"/>
+                <a:gd name="connsiteY3" fmla="*/ 2191872 h 2191872"/>
+                <a:gd name="connsiteX0" fmla="*/ 0 w 2573769"/>
+                <a:gd name="connsiteY0" fmla="*/ 2191882 h 2191882"/>
+                <a:gd name="connsiteX1" fmla="*/ 1286885 w 2573769"/>
+                <a:gd name="connsiteY1" fmla="*/ 10 h 2191882"/>
+                <a:gd name="connsiteX2" fmla="*/ 2573769 w 2573769"/>
+                <a:gd name="connsiteY2" fmla="*/ 2191882 h 2191882"/>
+                <a:gd name="connsiteX3" fmla="*/ 0 w 2573769"/>
+                <a:gd name="connsiteY3" fmla="*/ 2191882 h 2191882"/>
+                <a:gd name="connsiteX0" fmla="*/ 48203 w 2621972"/>
+                <a:gd name="connsiteY0" fmla="*/ 2191882 h 2462815"/>
+                <a:gd name="connsiteX1" fmla="*/ 1335088 w 2621972"/>
+                <a:gd name="connsiteY1" fmla="*/ 10 h 2462815"/>
+                <a:gd name="connsiteX2" fmla="*/ 2621972 w 2621972"/>
+                <a:gd name="connsiteY2" fmla="*/ 2191882 h 2462815"/>
+                <a:gd name="connsiteX3" fmla="*/ 48203 w 2621972"/>
+                <a:gd name="connsiteY3" fmla="*/ 2191882 h 2462815"/>
+                <a:gd name="connsiteX0" fmla="*/ 48203 w 2651690"/>
+                <a:gd name="connsiteY0" fmla="*/ 2191882 h 2604941"/>
+                <a:gd name="connsiteX1" fmla="*/ 1335088 w 2651690"/>
+                <a:gd name="connsiteY1" fmla="*/ 10 h 2604941"/>
+                <a:gd name="connsiteX2" fmla="*/ 2621972 w 2651690"/>
+                <a:gd name="connsiteY2" fmla="*/ 2191882 h 2604941"/>
+                <a:gd name="connsiteX3" fmla="*/ 48203 w 2651690"/>
+                <a:gd name="connsiteY3" fmla="*/ 2191882 h 2604941"/>
+                <a:gd name="connsiteX0" fmla="*/ 79031 w 2706431"/>
+                <a:gd name="connsiteY0" fmla="*/ 2192225 h 2605284"/>
+                <a:gd name="connsiteX1" fmla="*/ 1365916 w 2706431"/>
+                <a:gd name="connsiteY1" fmla="*/ 353 h 2605284"/>
+                <a:gd name="connsiteX2" fmla="*/ 2652800 w 2706431"/>
+                <a:gd name="connsiteY2" fmla="*/ 2192225 h 2605284"/>
+                <a:gd name="connsiteX3" fmla="*/ 79031 w 2706431"/>
+                <a:gd name="connsiteY3" fmla="*/ 2192225 h 2605284"/>
+                <a:gd name="connsiteX0" fmla="*/ 68339 w 2699899"/>
+                <a:gd name="connsiteY0" fmla="*/ 2557563 h 2877223"/>
+                <a:gd name="connsiteX1" fmla="*/ 1322005 w 2699899"/>
+                <a:gd name="connsiteY1" fmla="*/ 284 h 2877223"/>
+                <a:gd name="connsiteX2" fmla="*/ 2642108 w 2699899"/>
+                <a:gd name="connsiteY2" fmla="*/ 2557563 h 2877223"/>
+                <a:gd name="connsiteX3" fmla="*/ 68339 w 2699899"/>
+                <a:gd name="connsiteY3" fmla="*/ 2557563 h 2877223"/>
+                <a:gd name="connsiteX0" fmla="*/ 261036 w 2892596"/>
+                <a:gd name="connsiteY0" fmla="*/ 2557563 h 3038073"/>
+                <a:gd name="connsiteX1" fmla="*/ 1514702 w 2892596"/>
+                <a:gd name="connsiteY1" fmla="*/ 284 h 3038073"/>
+                <a:gd name="connsiteX2" fmla="*/ 2834805 w 2892596"/>
+                <a:gd name="connsiteY2" fmla="*/ 2557563 h 3038073"/>
+                <a:gd name="connsiteX3" fmla="*/ 261036 w 2892596"/>
+                <a:gd name="connsiteY3" fmla="*/ 2557563 h 3038073"/>
+                <a:gd name="connsiteX0" fmla="*/ 261036 w 3052240"/>
+                <a:gd name="connsiteY0" fmla="*/ 2557632 h 3188782"/>
+                <a:gd name="connsiteX1" fmla="*/ 1514702 w 3052240"/>
+                <a:gd name="connsiteY1" fmla="*/ 353 h 3188782"/>
+                <a:gd name="connsiteX2" fmla="*/ 2834805 w 3052240"/>
+                <a:gd name="connsiteY2" fmla="*/ 2557632 h 3188782"/>
+                <a:gd name="connsiteX3" fmla="*/ 261036 w 3052240"/>
+                <a:gd name="connsiteY3" fmla="*/ 2557632 h 3188782"/>
+              </a:gdLst>
+              <a:ahLst/>
+              <a:cxnLst>
+                <a:cxn ang="0">
+                  <a:pos x="connsiteX0" y="connsiteY0"/>
+                </a:cxn>
+                <a:cxn ang="0">
+                  <a:pos x="connsiteX1" y="connsiteY1"/>
+                </a:cxn>
+                <a:cxn ang="0">
+                  <a:pos x="connsiteX2" y="connsiteY2"/>
+                </a:cxn>
+                <a:cxn ang="0">
+                  <a:pos x="connsiteX3" y="connsiteY3"/>
+                </a:cxn>
+              </a:cxnLst>
+              <a:rect l="l" t="t" r="r" b="b"/>
+              <a:pathLst>
+                <a:path w="3052240" h="3188782">
+                  <a:moveTo>
+                    <a:pt x="261036" y="2557632"/>
+                  </a:moveTo>
+                  <a:cubicBezTo>
+                    <a:pt x="-424047" y="1732790"/>
+                    <a:pt x="324839" y="29091"/>
+                    <a:pt x="1514702" y="353"/>
+                  </a:cubicBezTo>
+                  <a:cubicBezTo>
+                    <a:pt x="2704565" y="-28385"/>
+                    <a:pt x="3442378" y="1699571"/>
+                    <a:pt x="2834805" y="2557632"/>
+                  </a:cubicBezTo>
+                  <a:cubicBezTo>
+                    <a:pt x="2227232" y="3415693"/>
+                    <a:pt x="946119" y="3382474"/>
+                    <a:pt x="261036" y="2557632"/>
+                  </a:cubicBezTo>
+                  <a:close/>
+                </a:path>
+              </a:pathLst>
+            </a:custGeom>
+            <a:solidFill>
+              <a:schemeClr val="bg1"/>
+            </a:solidFill>
+            <a:ln>
+              <a:noFill/>
+            </a:ln>
+          </p:spPr>
+          <p:style>
+            <a:lnRef idx="2">
+              <a:schemeClr val="accent1">
+                <a:shade val="50000"/>
+              </a:schemeClr>
+            </a:lnRef>
+            <a:fillRef idx="1">
+              <a:schemeClr val="accent1"/>
+            </a:fillRef>
+            <a:effectRef idx="0">
+              <a:schemeClr val="accent1"/>
+            </a:effectRef>
+            <a:fontRef idx="minor">
+              <a:schemeClr val="lt1"/>
+            </a:fontRef>
+          </p:style>
+          <p:txBody>
+            <a:bodyPr rtlCol="0" anchor="ctr"/>
+            <a:lstStyle/>
+            <a:p>
+              <a:pPr algn="ctr"/>
+              <a:endParaRPr lang="en-IN"/>
+            </a:p>
+          </p:txBody>
+        </p:sp>
+      </p:grpSp>
+    </p:spTree>
+    <p:extLst>
+      <p:ext uri="{BB962C8B-B14F-4D97-AF65-F5344CB8AC3E}">
+        <p14:creationId xmlns:p14="http://schemas.microsoft.com/office/powerpoint/2010/main" val="2245769588"/>
+      </p:ext>
+    </p:extLst>
+  </p:cSld>
+  <p:clrMapOvr>
+    <a:masterClrMapping/>
+  </p:clrMapOvr>
+  <p:timing>
+    <p:tnLst>
+      <p:par>
+        <p:cTn id="1" dur="indefinite" restart="never" nodeType="tmRoot"/>
+      </p:par>
+    </p:tnLst>
+  </p:timing>
+</p:sld>
+</file>
+
 <file path=ppt/theme/theme1.xml><?xml version="1.0" encoding="utf-8"?>
 <a:theme xmlns:a="http://schemas.openxmlformats.org/drawingml/2006/main" name="Office Theme">
   <a:themeElements>

</xml_diff>